<commit_message>
Tidied up some files. WIP Navigation presentation. Finished AVI-01.
</commit_message>
<xml_diff>
--- a/TRP/BAS/BAS-01/494(P)-BAS-01 - Trainee Presentation.pptx
+++ b/TRP/BAS/BAS-01/494(P)-BAS-01 - Trainee Presentation.pptx
@@ -226,18 +226,26 @@
   <pc:docChgLst>
     <pc:chgData name="Adam Arkley" userId="d399d8a812f0f754" providerId="LiveId" clId="{CFE058CD-12C4-4C77-9E09-F9656C083B15}"/>
     <pc:docChg chg="undo redo custSel addSld delSld modSld sldOrd addSection delSection modSection">
-      <pc:chgData name="Adam Arkley" userId="d399d8a812f0f754" providerId="LiveId" clId="{CFE058CD-12C4-4C77-9E09-F9656C083B15}" dt="2020-09-26T15:22:31.181" v="3621" actId="20577"/>
+      <pc:chgData name="Adam Arkley" userId="d399d8a812f0f754" providerId="LiveId" clId="{CFE058CD-12C4-4C77-9E09-F9656C083B15}" dt="2020-10-01T17:20:22.979" v="3650" actId="20577"/>
       <pc:docMkLst>
         <pc:docMk/>
       </pc:docMkLst>
       <pc:sldChg chg="modSp mod">
-        <pc:chgData name="Adam Arkley" userId="d399d8a812f0f754" providerId="LiveId" clId="{CFE058CD-12C4-4C77-9E09-F9656C083B15}" dt="2020-09-23T09:18:53.341" v="3195" actId="20577"/>
+        <pc:chgData name="Adam Arkley" userId="d399d8a812f0f754" providerId="LiveId" clId="{CFE058CD-12C4-4C77-9E09-F9656C083B15}" dt="2020-10-01T17:20:22.979" v="3650" actId="20577"/>
         <pc:sldMkLst>
           <pc:docMk/>
           <pc:sldMk cId="2701037055" sldId="256"/>
         </pc:sldMkLst>
         <pc:spChg chg="mod">
-          <ac:chgData name="Adam Arkley" userId="d399d8a812f0f754" providerId="LiveId" clId="{CFE058CD-12C4-4C77-9E09-F9656C083B15}" dt="2020-09-23T09:18:50.878" v="3193" actId="20577"/>
+          <ac:chgData name="Adam Arkley" userId="d399d8a812f0f754" providerId="LiveId" clId="{CFE058CD-12C4-4C77-9E09-F9656C083B15}" dt="2020-10-01T17:20:11.279" v="3628" actId="1076"/>
+          <ac:spMkLst>
+            <pc:docMk/>
+            <pc:sldMk cId="2701037055" sldId="256"/>
+            <ac:spMk id="2" creationId="{B85CA9A3-4DC8-45AC-92F2-BEE16ECE63EB}"/>
+          </ac:spMkLst>
+        </pc:spChg>
+        <pc:spChg chg="mod">
+          <ac:chgData name="Adam Arkley" userId="d399d8a812f0f754" providerId="LiveId" clId="{CFE058CD-12C4-4C77-9E09-F9656C083B15}" dt="2020-10-01T17:20:17.994" v="3640" actId="20577"/>
           <ac:spMkLst>
             <pc:docMk/>
             <pc:sldMk cId="2701037055" sldId="256"/>
@@ -245,7 +253,7 @@
           </ac:spMkLst>
         </pc:spChg>
         <pc:spChg chg="mod">
-          <ac:chgData name="Adam Arkley" userId="d399d8a812f0f754" providerId="LiveId" clId="{CFE058CD-12C4-4C77-9E09-F9656C083B15}" dt="2020-09-23T09:18:53.341" v="3195" actId="20577"/>
+          <ac:chgData name="Adam Arkley" userId="d399d8a812f0f754" providerId="LiveId" clId="{CFE058CD-12C4-4C77-9E09-F9656C083B15}" dt="2020-10-01T17:20:22.979" v="3650" actId="20577"/>
           <ac:spMkLst>
             <pc:docMk/>
             <pc:sldMk cId="2701037055" sldId="256"/>
@@ -451,7 +459,7 @@
         </pc:spChg>
       </pc:sldChg>
       <pc:sldChg chg="modSp add mod ord">
-        <pc:chgData name="Adam Arkley" userId="d399d8a812f0f754" providerId="LiveId" clId="{CFE058CD-12C4-4C77-9E09-F9656C083B15}" dt="2020-09-26T15:22:31.181" v="3621" actId="20577"/>
+        <pc:chgData name="Adam Arkley" userId="d399d8a812f0f754" providerId="LiveId" clId="{CFE058CD-12C4-4C77-9E09-F9656C083B15}" dt="2020-10-01T17:19:56.163" v="3623" actId="20577"/>
         <pc:sldMkLst>
           <pc:docMk/>
           <pc:sldMk cId="1457849939" sldId="274"/>
@@ -465,7 +473,7 @@
           </ac:spMkLst>
         </pc:spChg>
         <pc:spChg chg="mod">
-          <ac:chgData name="Adam Arkley" userId="d399d8a812f0f754" providerId="LiveId" clId="{CFE058CD-12C4-4C77-9E09-F9656C083B15}" dt="2020-09-26T15:22:31.181" v="3621" actId="20577"/>
+          <ac:chgData name="Adam Arkley" userId="d399d8a812f0f754" providerId="LiveId" clId="{CFE058CD-12C4-4C77-9E09-F9656C083B15}" dt="2020-10-01T17:19:56.163" v="3623" actId="20577"/>
           <ac:spMkLst>
             <pc:docMk/>
             <pc:sldMk cId="1457849939" sldId="274"/>
@@ -1857,7 +1865,7 @@
             <a:fld id="{C89BED82-0386-424B-8522-487198B6AAA6}" type="datetimeFigureOut">
               <a:rPr lang="nb-NO" smtClean="0"/>
               <a:pPr/>
-              <a:t>26.09.2020</a:t>
+              <a:t>01.10.2020</a:t>
             </a:fld>
             <a:endParaRPr lang="nb-NO"/>
           </a:p>
@@ -2409,7 +2417,7 @@
           <a:p>
             <a:fld id="{3434F07C-7B4A-4A07-9283-14DC65FBC703}" type="datetimeFigureOut">
               <a:rPr lang="en-GB" smtClean="0"/>
-              <a:t>26/09/2020</a:t>
+              <a:t>01/10/2020</a:t>
             </a:fld>
             <a:endParaRPr lang="en-GB"/>
           </a:p>
@@ -2649,7 +2657,7 @@
           <a:p>
             <a:fld id="{3434F07C-7B4A-4A07-9283-14DC65FBC703}" type="datetimeFigureOut">
               <a:rPr lang="en-GB" smtClean="0"/>
-              <a:t>26/09/2020</a:t>
+              <a:t>01/10/2020</a:t>
             </a:fld>
             <a:endParaRPr lang="en-GB"/>
           </a:p>
@@ -2926,7 +2934,7 @@
             <a:fld id="{BB56636F-9E64-48A9-A0E8-D6911EA208CE}" type="datetimeFigureOut">
               <a:rPr lang="nb-NO" smtClean="0"/>
               <a:pPr/>
-              <a:t>26.09.2020</a:t>
+              <a:t>01.10.2020</a:t>
             </a:fld>
             <a:endParaRPr lang="nb-NO"/>
           </a:p>
@@ -3487,7 +3495,7 @@
           <a:p>
             <a:fld id="{3434F07C-7B4A-4A07-9283-14DC65FBC703}" type="datetimeFigureOut">
               <a:rPr lang="en-GB" smtClean="0"/>
-              <a:t>26/09/2020</a:t>
+              <a:t>01/10/2020</a:t>
             </a:fld>
             <a:endParaRPr lang="en-GB"/>
           </a:p>
@@ -3793,7 +3801,7 @@
           <a:p>
             <a:fld id="{3434F07C-7B4A-4A07-9283-14DC65FBC703}" type="datetimeFigureOut">
               <a:rPr lang="en-GB" smtClean="0"/>
-              <a:t>26/09/2020</a:t>
+              <a:t>01/10/2020</a:t>
             </a:fld>
             <a:endParaRPr lang="en-GB"/>
           </a:p>
@@ -4247,7 +4255,7 @@
           <a:p>
             <a:fld id="{3434F07C-7B4A-4A07-9283-14DC65FBC703}" type="datetimeFigureOut">
               <a:rPr lang="en-GB" smtClean="0"/>
-              <a:t>26/09/2020</a:t>
+              <a:t>01/10/2020</a:t>
             </a:fld>
             <a:endParaRPr lang="en-GB"/>
           </a:p>
@@ -4421,7 +4429,7 @@
           <a:p>
             <a:fld id="{3434F07C-7B4A-4A07-9283-14DC65FBC703}" type="datetimeFigureOut">
               <a:rPr lang="en-GB" smtClean="0"/>
-              <a:t>26/09/2020</a:t>
+              <a:t>01/10/2020</a:t>
             </a:fld>
             <a:endParaRPr lang="en-GB"/>
           </a:p>
@@ -4558,7 +4566,7 @@
           <a:p>
             <a:fld id="{3434F07C-7B4A-4A07-9283-14DC65FBC703}" type="datetimeFigureOut">
               <a:rPr lang="en-GB" smtClean="0"/>
-              <a:t>26/09/2020</a:t>
+              <a:t>01/10/2020</a:t>
             </a:fld>
             <a:endParaRPr lang="en-GB"/>
           </a:p>
@@ -4798,7 +4806,7 @@
           <a:p>
             <a:fld id="{3434F07C-7B4A-4A07-9283-14DC65FBC703}" type="datetimeFigureOut">
               <a:rPr lang="en-GB" smtClean="0"/>
-              <a:t>26/09/2020</a:t>
+              <a:t>01/10/2020</a:t>
             </a:fld>
             <a:endParaRPr lang="en-GB"/>
           </a:p>
@@ -5144,7 +5152,7 @@
           <a:p>
             <a:fld id="{3434F07C-7B4A-4A07-9283-14DC65FBC703}" type="datetimeFigureOut">
               <a:rPr lang="en-GB" smtClean="0"/>
-              <a:t>26/09/2020</a:t>
+              <a:t>01/10/2020</a:t>
             </a:fld>
             <a:endParaRPr lang="en-GB"/>
           </a:p>
@@ -5466,7 +5474,7 @@
           <a:p>
             <a:fld id="{3434F07C-7B4A-4A07-9283-14DC65FBC703}" type="datetimeFigureOut">
               <a:rPr lang="en-GB" smtClean="0"/>
-              <a:t>26/09/2020</a:t>
+              <a:t>01/10/2020</a:t>
             </a:fld>
             <a:endParaRPr lang="en-GB"/>
           </a:p>
@@ -5706,7 +5714,7 @@
           <a:p>
             <a:fld id="{3434F07C-7B4A-4A07-9283-14DC65FBC703}" type="datetimeFigureOut">
               <a:rPr lang="en-GB" smtClean="0"/>
-              <a:t>26/09/2020</a:t>
+              <a:t>01/10/2020</a:t>
             </a:fld>
             <a:endParaRPr lang="en-GB"/>
           </a:p>
@@ -5946,7 +5954,7 @@
           <a:p>
             <a:fld id="{3434F07C-7B4A-4A07-9283-14DC65FBC703}" type="datetimeFigureOut">
               <a:rPr lang="en-GB" smtClean="0"/>
-              <a:t>26/09/2020</a:t>
+              <a:t>01/10/2020</a:t>
             </a:fld>
             <a:endParaRPr lang="en-GB"/>
           </a:p>
@@ -6223,7 +6231,7 @@
             <a:fld id="{BB56636F-9E64-48A9-A0E8-D6911EA208CE}" type="datetimeFigureOut">
               <a:rPr lang="nb-NO" smtClean="0"/>
               <a:pPr/>
-              <a:t>26.09.2020</a:t>
+              <a:t>01.10.2020</a:t>
             </a:fld>
             <a:endParaRPr lang="nb-NO"/>
           </a:p>
@@ -6518,7 +6526,7 @@
           <a:p>
             <a:fld id="{3434F07C-7B4A-4A07-9283-14DC65FBC703}" type="datetimeFigureOut">
               <a:rPr lang="en-GB" smtClean="0"/>
-              <a:t>26/09/2020</a:t>
+              <a:t>01/10/2020</a:t>
             </a:fld>
             <a:endParaRPr lang="en-GB"/>
           </a:p>
@@ -6824,7 +6832,7 @@
           <a:p>
             <a:fld id="{3434F07C-7B4A-4A07-9283-14DC65FBC703}" type="datetimeFigureOut">
               <a:rPr lang="en-GB" smtClean="0"/>
-              <a:t>26/09/2020</a:t>
+              <a:t>01/10/2020</a:t>
             </a:fld>
             <a:endParaRPr lang="en-GB"/>
           </a:p>
@@ -7278,7 +7286,7 @@
           <a:p>
             <a:fld id="{3434F07C-7B4A-4A07-9283-14DC65FBC703}" type="datetimeFigureOut">
               <a:rPr lang="en-GB" smtClean="0"/>
-              <a:t>26/09/2020</a:t>
+              <a:t>01/10/2020</a:t>
             </a:fld>
             <a:endParaRPr lang="en-GB"/>
           </a:p>
@@ -7452,7 +7460,7 @@
           <a:p>
             <a:fld id="{3434F07C-7B4A-4A07-9283-14DC65FBC703}" type="datetimeFigureOut">
               <a:rPr lang="en-GB" smtClean="0"/>
-              <a:t>26/09/2020</a:t>
+              <a:t>01/10/2020</a:t>
             </a:fld>
             <a:endParaRPr lang="en-GB"/>
           </a:p>
@@ -7589,7 +7597,7 @@
           <a:p>
             <a:fld id="{3434F07C-7B4A-4A07-9283-14DC65FBC703}" type="datetimeFigureOut">
               <a:rPr lang="en-GB" smtClean="0"/>
-              <a:t>26/09/2020</a:t>
+              <a:t>01/10/2020</a:t>
             </a:fld>
             <a:endParaRPr lang="en-GB"/>
           </a:p>
@@ -7935,7 +7943,7 @@
           <a:p>
             <a:fld id="{3434F07C-7B4A-4A07-9283-14DC65FBC703}" type="datetimeFigureOut">
               <a:rPr lang="en-GB" smtClean="0"/>
-              <a:t>26/09/2020</a:t>
+              <a:t>01/10/2020</a:t>
             </a:fld>
             <a:endParaRPr lang="en-GB"/>
           </a:p>
@@ -8257,7 +8265,7 @@
           <a:p>
             <a:fld id="{3434F07C-7B4A-4A07-9283-14DC65FBC703}" type="datetimeFigureOut">
               <a:rPr lang="en-GB" smtClean="0"/>
-              <a:t>26/09/2020</a:t>
+              <a:t>01/10/2020</a:t>
             </a:fld>
             <a:endParaRPr lang="en-GB"/>
           </a:p>
@@ -9721,8 +9729,8 @@
         </p:nvSpPr>
         <p:spPr>
           <a:xfrm>
-            <a:off x="647564" y="4654877"/>
-            <a:ext cx="7848872" cy="646331"/>
+            <a:off x="647925" y="4690060"/>
+            <a:ext cx="8028892" cy="646331"/>
           </a:xfrm>
           <a:prstGeom prst="rect">
             <a:avLst/>
@@ -9738,7 +9746,7 @@
             <a:pPr algn="ctr"/>
             <a:r>
               <a:rPr lang="en-GB" sz="3600" dirty="0"/>
-              <a:t>494-BAS-01: Basic Game Configuration</a:t>
+              <a:t>494(P)-BAS-01: Basic Game Configuration</a:t>
             </a:r>
           </a:p>
         </p:txBody>
@@ -9808,7 +9816,7 @@
           <a:p>
             <a:r>
               <a:rPr lang="en-GB" sz="1200" dirty="0"/>
-              <a:t>23 Sep 2020</a:t>
+              <a:t>01 Oct 2020</a:t>
             </a:r>
           </a:p>
         </p:txBody>
@@ -9842,8 +9850,12 @@
           <a:lstStyle/>
           <a:p>
             <a:r>
+              <a:rPr lang="en-GB" sz="1200"/>
+              <a:t>01 Apr </a:t>
+            </a:r>
+            <a:r>
               <a:rPr lang="en-GB" sz="1200" dirty="0"/>
-              <a:t>23 Mar 2021</a:t>
+              <a:t>2021</a:t>
             </a:r>
           </a:p>
         </p:txBody>
@@ -10820,7 +10832,7 @@
             </a:r>
             <a:r>
               <a:rPr lang="en-GB" sz="2500" dirty="0" err="1"/>
-              <a:t>Rshift</a:t>
+              <a:t>RShift</a:t>
             </a:r>
             <a:r>
               <a:rPr lang="en-GB" sz="2500" dirty="0"/>

</xml_diff>